<commit_message>
Doc y Presentacion Vision
</commit_message>
<xml_diff>
--- a/Vision/proyecto/Proyecto.pptx
+++ b/Vision/proyecto/Proyecto.pptx
@@ -8,9 +8,15 @@
     <p:sldId id="256" r:id="rId2"/>
     <p:sldId id="257" r:id="rId3"/>
     <p:sldId id="258" r:id="rId4"/>
-    <p:sldId id="259" r:id="rId5"/>
-    <p:sldId id="260" r:id="rId6"/>
-    <p:sldId id="261" r:id="rId7"/>
+    <p:sldId id="260" r:id="rId5"/>
+    <p:sldId id="262" r:id="rId6"/>
+    <p:sldId id="259" r:id="rId7"/>
+    <p:sldId id="263" r:id="rId8"/>
+    <p:sldId id="268" r:id="rId9"/>
+    <p:sldId id="264" r:id="rId10"/>
+    <p:sldId id="265" r:id="rId11"/>
+    <p:sldId id="266" r:id="rId12"/>
+    <p:sldId id="267" r:id="rId13"/>
   </p:sldIdLst>
   <p:sldSz cx="12192000" cy="6858000"/>
   <p:notesSz cx="6858000" cy="9144000"/>
@@ -109,6 +115,11 @@
       </a:defRPr>
     </a:lvl9pPr>
   </p:defaultTextStyle>
+  <p:extLst>
+    <p:ext uri="{EFAFB233-063F-42B5-8137-9DF3F51BA10A}">
+      <p15:sldGuideLst xmlns:p15="http://schemas.microsoft.com/office/powerpoint/2012/main"/>
+    </p:ext>
+  </p:extLst>
 </p:presentation>
 </file>
 
@@ -173,7 +184,7 @@
           <a:noFill/>
           <a:extLst>
             <a:ext uri="{909E8E84-426E-40dd-AFC4-6F175D3DCCD1}">
-              <a14:hiddenFill xmlns:a14="http://schemas.microsoft.com/office/drawing/2010/main" xmlns="">
+              <a14:hiddenFill xmlns="" xmlns:a14="http://schemas.microsoft.com/office/drawing/2010/main">
                 <a:solidFill>
                   <a:srgbClr val="FFFFFF"/>
                 </a:solidFill>
@@ -232,7 +243,7 @@
             </a:ln>
             <a:extLst>
               <a:ext uri="{91240B29-F687-4f45-9708-019B960494DF}">
-                <a14:hiddenLine xmlns:a14="http://schemas.microsoft.com/office/drawing/2010/main" xmlns="" w="9525">
+                <a14:hiddenLine xmlns="" xmlns:a14="http://schemas.microsoft.com/office/drawing/2010/main" w="9525">
                   <a:solidFill>
                     <a:srgbClr val="000000"/>
                   </a:solidFill>
@@ -322,7 +333,7 @@
             </a:ln>
             <a:extLst>
               <a:ext uri="{91240B29-F687-4f45-9708-019B960494DF}">
-                <a14:hiddenLine xmlns:a14="http://schemas.microsoft.com/office/drawing/2010/main" xmlns="" w="9525">
+                <a14:hiddenLine xmlns="" xmlns:a14="http://schemas.microsoft.com/office/drawing/2010/main" w="9525">
                   <a:solidFill>
                     <a:srgbClr val="000000"/>
                   </a:solidFill>
@@ -412,7 +423,7 @@
             </a:ln>
             <a:extLst>
               <a:ext uri="{91240B29-F687-4f45-9708-019B960494DF}">
-                <a14:hiddenLine xmlns:a14="http://schemas.microsoft.com/office/drawing/2010/main" xmlns="" w="9525">
+                <a14:hiddenLine xmlns="" xmlns:a14="http://schemas.microsoft.com/office/drawing/2010/main" w="9525">
                   <a:solidFill>
                     <a:srgbClr val="000000"/>
                   </a:solidFill>
@@ -446,7 +457,7 @@
             </a:ln>
             <a:extLst>
               <a:ext uri="{91240B29-F687-4f45-9708-019B960494DF}">
-                <a14:hiddenLine xmlns:a14="http://schemas.microsoft.com/office/drawing/2010/main" xmlns="" w="9525">
+                <a14:hiddenLine xmlns="" xmlns:a14="http://schemas.microsoft.com/office/drawing/2010/main" w="9525">
                   <a:solidFill>
                     <a:srgbClr val="000000"/>
                   </a:solidFill>
@@ -536,7 +547,7 @@
             </a:ln>
             <a:extLst>
               <a:ext uri="{91240B29-F687-4f45-9708-019B960494DF}">
-                <a14:hiddenLine xmlns:a14="http://schemas.microsoft.com/office/drawing/2010/main" xmlns="" w="9525">
+                <a14:hiddenLine xmlns="" xmlns:a14="http://schemas.microsoft.com/office/drawing/2010/main" w="9525">
                   <a:solidFill>
                     <a:srgbClr val="000000"/>
                   </a:solidFill>
@@ -598,7 +609,7 @@
             </a:ln>
             <a:extLst>
               <a:ext uri="{91240B29-F687-4f45-9708-019B960494DF}">
-                <a14:hiddenLine xmlns:a14="http://schemas.microsoft.com/office/drawing/2010/main" xmlns="" w="9525">
+                <a14:hiddenLine xmlns="" xmlns:a14="http://schemas.microsoft.com/office/drawing/2010/main" w="9525">
                   <a:solidFill>
                     <a:srgbClr val="000000"/>
                   </a:solidFill>
@@ -660,7 +671,7 @@
             </a:ln>
             <a:extLst>
               <a:ext uri="{91240B29-F687-4f45-9708-019B960494DF}">
-                <a14:hiddenLine xmlns:a14="http://schemas.microsoft.com/office/drawing/2010/main" xmlns="" w="9525">
+                <a14:hiddenLine xmlns="" xmlns:a14="http://schemas.microsoft.com/office/drawing/2010/main" w="9525">
                   <a:solidFill>
                     <a:srgbClr val="000000"/>
                   </a:solidFill>
@@ -750,7 +761,7 @@
             </a:ln>
             <a:extLst>
               <a:ext uri="{91240B29-F687-4f45-9708-019B960494DF}">
-                <a14:hiddenLine xmlns:a14="http://schemas.microsoft.com/office/drawing/2010/main" xmlns="" w="9525">
+                <a14:hiddenLine xmlns="" xmlns:a14="http://schemas.microsoft.com/office/drawing/2010/main" w="9525">
                   <a:solidFill>
                     <a:srgbClr val="000000"/>
                   </a:solidFill>
@@ -812,7 +823,7 @@
             </a:ln>
             <a:extLst>
               <a:ext uri="{91240B29-F687-4f45-9708-019B960494DF}">
-                <a14:hiddenLine xmlns:a14="http://schemas.microsoft.com/office/drawing/2010/main" xmlns="" w="9525">
+                <a14:hiddenLine xmlns="" xmlns:a14="http://schemas.microsoft.com/office/drawing/2010/main" w="9525">
                   <a:solidFill>
                     <a:srgbClr val="000000"/>
                   </a:solidFill>
@@ -874,7 +885,7 @@
             </a:ln>
             <a:extLst>
               <a:ext uri="{91240B29-F687-4f45-9708-019B960494DF}">
-                <a14:hiddenLine xmlns:a14="http://schemas.microsoft.com/office/drawing/2010/main" xmlns="" w="9525">
+                <a14:hiddenLine xmlns="" xmlns:a14="http://schemas.microsoft.com/office/drawing/2010/main" w="9525">
                   <a:solidFill>
                     <a:srgbClr val="000000"/>
                   </a:solidFill>
@@ -964,7 +975,7 @@
             </a:ln>
             <a:extLst>
               <a:ext uri="{91240B29-F687-4f45-9708-019B960494DF}">
-                <a14:hiddenLine xmlns:a14="http://schemas.microsoft.com/office/drawing/2010/main" xmlns="" w="9525">
+                <a14:hiddenLine xmlns="" xmlns:a14="http://schemas.microsoft.com/office/drawing/2010/main" w="9525">
                   <a:solidFill>
                     <a:srgbClr val="000000"/>
                   </a:solidFill>
@@ -1054,7 +1065,7 @@
             </a:ln>
             <a:extLst>
               <a:ext uri="{91240B29-F687-4f45-9708-019B960494DF}">
-                <a14:hiddenLine xmlns:a14="http://schemas.microsoft.com/office/drawing/2010/main" xmlns="" w="9525">
+                <a14:hiddenLine xmlns="" xmlns:a14="http://schemas.microsoft.com/office/drawing/2010/main" w="9525">
                   <a:solidFill>
                     <a:srgbClr val="000000"/>
                   </a:solidFill>
@@ -1116,7 +1127,7 @@
             </a:ln>
             <a:extLst>
               <a:ext uri="{91240B29-F687-4f45-9708-019B960494DF}">
-                <a14:hiddenLine xmlns:a14="http://schemas.microsoft.com/office/drawing/2010/main" xmlns="" w="9525">
+                <a14:hiddenLine xmlns="" xmlns:a14="http://schemas.microsoft.com/office/drawing/2010/main" w="9525">
                   <a:solidFill>
                     <a:srgbClr val="000000"/>
                   </a:solidFill>
@@ -1226,7 +1237,7 @@
             </a:ln>
             <a:extLst>
               <a:ext uri="{91240B29-F687-4f45-9708-019B960494DF}">
-                <a14:hiddenLine xmlns:a14="http://schemas.microsoft.com/office/drawing/2010/main" xmlns="" w="9525">
+                <a14:hiddenLine xmlns="" xmlns:a14="http://schemas.microsoft.com/office/drawing/2010/main" w="9525">
                   <a:solidFill>
                     <a:srgbClr val="000000"/>
                   </a:solidFill>
@@ -1288,7 +1299,7 @@
             </a:ln>
             <a:extLst>
               <a:ext uri="{91240B29-F687-4f45-9708-019B960494DF}">
-                <a14:hiddenLine xmlns:a14="http://schemas.microsoft.com/office/drawing/2010/main" xmlns="" w="9525">
+                <a14:hiddenLine xmlns="" xmlns:a14="http://schemas.microsoft.com/office/drawing/2010/main" w="9525">
                   <a:solidFill>
                     <a:srgbClr val="000000"/>
                   </a:solidFill>
@@ -1378,7 +1389,7 @@
             </a:ln>
             <a:extLst>
               <a:ext uri="{91240B29-F687-4f45-9708-019B960494DF}">
-                <a14:hiddenLine xmlns:a14="http://schemas.microsoft.com/office/drawing/2010/main" xmlns="" w="9525">
+                <a14:hiddenLine xmlns="" xmlns:a14="http://schemas.microsoft.com/office/drawing/2010/main" w="9525">
                   <a:solidFill>
                     <a:srgbClr val="000000"/>
                   </a:solidFill>
@@ -1468,7 +1479,7 @@
             </a:ln>
             <a:extLst>
               <a:ext uri="{91240B29-F687-4f45-9708-019B960494DF}">
-                <a14:hiddenLine xmlns:a14="http://schemas.microsoft.com/office/drawing/2010/main" xmlns="" w="9525">
+                <a14:hiddenLine xmlns="" xmlns:a14="http://schemas.microsoft.com/office/drawing/2010/main" w="9525">
                   <a:solidFill>
                     <a:srgbClr val="000000"/>
                   </a:solidFill>
@@ -1530,7 +1541,7 @@
             </a:ln>
             <a:extLst>
               <a:ext uri="{91240B29-F687-4f45-9708-019B960494DF}">
-                <a14:hiddenLine xmlns:a14="http://schemas.microsoft.com/office/drawing/2010/main" xmlns="" w="9525">
+                <a14:hiddenLine xmlns="" xmlns:a14="http://schemas.microsoft.com/office/drawing/2010/main" w="9525">
                   <a:solidFill>
                     <a:srgbClr val="000000"/>
                   </a:solidFill>
@@ -1620,7 +1631,7 @@
             </a:ln>
             <a:extLst>
               <a:ext uri="{91240B29-F687-4f45-9708-019B960494DF}">
-                <a14:hiddenLine xmlns:a14="http://schemas.microsoft.com/office/drawing/2010/main" xmlns="" w="9525">
+                <a14:hiddenLine xmlns="" xmlns:a14="http://schemas.microsoft.com/office/drawing/2010/main" w="9525">
                   <a:solidFill>
                     <a:srgbClr val="000000"/>
                   </a:solidFill>
@@ -1710,7 +1721,7 @@
             </a:ln>
             <a:extLst>
               <a:ext uri="{91240B29-F687-4f45-9708-019B960494DF}">
-                <a14:hiddenLine xmlns:a14="http://schemas.microsoft.com/office/drawing/2010/main" xmlns="" w="9525">
+                <a14:hiddenLine xmlns="" xmlns:a14="http://schemas.microsoft.com/office/drawing/2010/main" w="9525">
                   <a:solidFill>
                     <a:srgbClr val="000000"/>
                   </a:solidFill>
@@ -1766,7 +1777,7 @@
             </a:ln>
             <a:extLst>
               <a:ext uri="{91240B29-F687-4f45-9708-019B960494DF}">
-                <a14:hiddenLine xmlns:a14="http://schemas.microsoft.com/office/drawing/2010/main" xmlns="" w="9525">
+                <a14:hiddenLine xmlns="" xmlns:a14="http://schemas.microsoft.com/office/drawing/2010/main" w="9525">
                   <a:solidFill>
                     <a:srgbClr val="000000"/>
                   </a:solidFill>
@@ -1856,7 +1867,7 @@
             </a:ln>
             <a:extLst>
               <a:ext uri="{91240B29-F687-4f45-9708-019B960494DF}">
-                <a14:hiddenLine xmlns:a14="http://schemas.microsoft.com/office/drawing/2010/main" xmlns="" w="9525">
+                <a14:hiddenLine xmlns="" xmlns:a14="http://schemas.microsoft.com/office/drawing/2010/main" w="9525">
                   <a:solidFill>
                     <a:srgbClr val="000000"/>
                   </a:solidFill>
@@ -1912,7 +1923,7 @@
             </a:ln>
             <a:extLst>
               <a:ext uri="{91240B29-F687-4f45-9708-019B960494DF}">
-                <a14:hiddenLine xmlns:a14="http://schemas.microsoft.com/office/drawing/2010/main" xmlns="" w="9525">
+                <a14:hiddenLine xmlns="" xmlns:a14="http://schemas.microsoft.com/office/drawing/2010/main" w="9525">
                   <a:solidFill>
                     <a:srgbClr val="000000"/>
                   </a:solidFill>
@@ -2002,7 +2013,7 @@
             </a:ln>
             <a:extLst>
               <a:ext uri="{91240B29-F687-4f45-9708-019B960494DF}">
-                <a14:hiddenLine xmlns:a14="http://schemas.microsoft.com/office/drawing/2010/main" xmlns="" w="9525">
+                <a14:hiddenLine xmlns="" xmlns:a14="http://schemas.microsoft.com/office/drawing/2010/main" w="9525">
                   <a:solidFill>
                     <a:srgbClr val="000000"/>
                   </a:solidFill>
@@ -2070,7 +2081,7 @@
             </a:ln>
             <a:extLst>
               <a:ext uri="{91240B29-F687-4f45-9708-019B960494DF}">
-                <a14:hiddenLine xmlns:a14="http://schemas.microsoft.com/office/drawing/2010/main" xmlns="" w="9525">
+                <a14:hiddenLine xmlns="" xmlns:a14="http://schemas.microsoft.com/office/drawing/2010/main" w="9525">
                   <a:solidFill>
                     <a:srgbClr val="000000"/>
                   </a:solidFill>
@@ -2160,7 +2171,7 @@
             </a:ln>
             <a:extLst>
               <a:ext uri="{91240B29-F687-4f45-9708-019B960494DF}">
-                <a14:hiddenLine xmlns:a14="http://schemas.microsoft.com/office/drawing/2010/main" xmlns="" w="9525">
+                <a14:hiddenLine xmlns="" xmlns:a14="http://schemas.microsoft.com/office/drawing/2010/main" w="9525">
                   <a:solidFill>
                     <a:srgbClr val="000000"/>
                   </a:solidFill>
@@ -2228,7 +2239,7 @@
             </a:ln>
             <a:extLst>
               <a:ext uri="{91240B29-F687-4f45-9708-019B960494DF}">
-                <a14:hiddenLine xmlns:a14="http://schemas.microsoft.com/office/drawing/2010/main" xmlns="" w="9525">
+                <a14:hiddenLine xmlns="" xmlns:a14="http://schemas.microsoft.com/office/drawing/2010/main" w="9525">
                   <a:solidFill>
                     <a:srgbClr val="000000"/>
                   </a:solidFill>
@@ -2318,7 +2329,7 @@
             </a:ln>
             <a:extLst>
               <a:ext uri="{91240B29-F687-4f45-9708-019B960494DF}">
-                <a14:hiddenLine xmlns:a14="http://schemas.microsoft.com/office/drawing/2010/main" xmlns="" w="9525">
+                <a14:hiddenLine xmlns="" xmlns:a14="http://schemas.microsoft.com/office/drawing/2010/main" w="9525">
                   <a:solidFill>
                     <a:srgbClr val="000000"/>
                   </a:solidFill>
@@ -2352,7 +2363,7 @@
             </a:ln>
             <a:extLst>
               <a:ext uri="{91240B29-F687-4f45-9708-019B960494DF}">
-                <a14:hiddenLine xmlns:a14="http://schemas.microsoft.com/office/drawing/2010/main" xmlns="" w="9525">
+                <a14:hiddenLine xmlns="" xmlns:a14="http://schemas.microsoft.com/office/drawing/2010/main" w="9525">
                   <a:solidFill>
                     <a:srgbClr val="000000"/>
                   </a:solidFill>
@@ -2442,7 +2453,7 @@
             </a:ln>
             <a:extLst>
               <a:ext uri="{91240B29-F687-4f45-9708-019B960494DF}">
-                <a14:hiddenLine xmlns:a14="http://schemas.microsoft.com/office/drawing/2010/main" xmlns="" w="9525">
+                <a14:hiddenLine xmlns="" xmlns:a14="http://schemas.microsoft.com/office/drawing/2010/main" w="9525">
                   <a:solidFill>
                     <a:srgbClr val="000000"/>
                   </a:solidFill>
@@ -2504,7 +2515,7 @@
             </a:ln>
             <a:extLst>
               <a:ext uri="{91240B29-F687-4f45-9708-019B960494DF}">
-                <a14:hiddenLine xmlns:a14="http://schemas.microsoft.com/office/drawing/2010/main" xmlns="" w="9525">
+                <a14:hiddenLine xmlns="" xmlns:a14="http://schemas.microsoft.com/office/drawing/2010/main" w="9525">
                   <a:solidFill>
                     <a:srgbClr val="000000"/>
                   </a:solidFill>
@@ -2566,7 +2577,7 @@
             </a:ln>
             <a:extLst>
               <a:ext uri="{91240B29-F687-4f45-9708-019B960494DF}">
-                <a14:hiddenLine xmlns:a14="http://schemas.microsoft.com/office/drawing/2010/main" xmlns="" w="9525">
+                <a14:hiddenLine xmlns="" xmlns:a14="http://schemas.microsoft.com/office/drawing/2010/main" w="9525">
                   <a:solidFill>
                     <a:srgbClr val="000000"/>
                   </a:solidFill>
@@ -2656,7 +2667,7 @@
             </a:ln>
             <a:extLst>
               <a:ext uri="{91240B29-F687-4f45-9708-019B960494DF}">
-                <a14:hiddenLine xmlns:a14="http://schemas.microsoft.com/office/drawing/2010/main" xmlns="" w="9525">
+                <a14:hiddenLine xmlns="" xmlns:a14="http://schemas.microsoft.com/office/drawing/2010/main" w="9525">
                   <a:solidFill>
                     <a:srgbClr val="000000"/>
                   </a:solidFill>
@@ -2724,7 +2735,7 @@
             </a:ln>
             <a:extLst>
               <a:ext uri="{91240B29-F687-4f45-9708-019B960494DF}">
-                <a14:hiddenLine xmlns:a14="http://schemas.microsoft.com/office/drawing/2010/main" xmlns="" w="9525">
+                <a14:hiddenLine xmlns="" xmlns:a14="http://schemas.microsoft.com/office/drawing/2010/main" w="9525">
                   <a:solidFill>
                     <a:srgbClr val="000000"/>
                   </a:solidFill>
@@ -2786,7 +2797,7 @@
             </a:ln>
             <a:extLst>
               <a:ext uri="{91240B29-F687-4f45-9708-019B960494DF}">
-                <a14:hiddenLine xmlns:a14="http://schemas.microsoft.com/office/drawing/2010/main" xmlns="" w="9525">
+                <a14:hiddenLine xmlns="" xmlns:a14="http://schemas.microsoft.com/office/drawing/2010/main" w="9525">
                   <a:solidFill>
                     <a:srgbClr val="000000"/>
                   </a:solidFill>
@@ -2876,7 +2887,7 @@
             </a:ln>
             <a:extLst>
               <a:ext uri="{91240B29-F687-4f45-9708-019B960494DF}">
-                <a14:hiddenLine xmlns:a14="http://schemas.microsoft.com/office/drawing/2010/main" xmlns="" w="9525">
+                <a14:hiddenLine xmlns="" xmlns:a14="http://schemas.microsoft.com/office/drawing/2010/main" w="9525">
                   <a:solidFill>
                     <a:srgbClr val="000000"/>
                   </a:solidFill>
@@ -2938,7 +2949,7 @@
             </a:ln>
             <a:extLst>
               <a:ext uri="{91240B29-F687-4f45-9708-019B960494DF}">
-                <a14:hiddenLine xmlns:a14="http://schemas.microsoft.com/office/drawing/2010/main" xmlns="" w="9525">
+                <a14:hiddenLine xmlns="" xmlns:a14="http://schemas.microsoft.com/office/drawing/2010/main" w="9525">
                   <a:solidFill>
                     <a:srgbClr val="000000"/>
                   </a:solidFill>
@@ -3028,7 +3039,7 @@
             </a:ln>
             <a:extLst>
               <a:ext uri="{91240B29-F687-4f45-9708-019B960494DF}">
-                <a14:hiddenLine xmlns:a14="http://schemas.microsoft.com/office/drawing/2010/main" xmlns="" w="9525">
+                <a14:hiddenLine xmlns="" xmlns:a14="http://schemas.microsoft.com/office/drawing/2010/main" w="9525">
                   <a:solidFill>
                     <a:srgbClr val="000000"/>
                   </a:solidFill>
@@ -3090,7 +3101,7 @@
             </a:ln>
             <a:extLst>
               <a:ext uri="{91240B29-F687-4f45-9708-019B960494DF}">
-                <a14:hiddenLine xmlns:a14="http://schemas.microsoft.com/office/drawing/2010/main" xmlns="" w="9525">
+                <a14:hiddenLine xmlns="" xmlns:a14="http://schemas.microsoft.com/office/drawing/2010/main" w="9525">
                   <a:solidFill>
                     <a:srgbClr val="000000"/>
                   </a:solidFill>
@@ -3180,7 +3191,7 @@
             </a:ln>
             <a:extLst>
               <a:ext uri="{91240B29-F687-4f45-9708-019B960494DF}">
-                <a14:hiddenLine xmlns:a14="http://schemas.microsoft.com/office/drawing/2010/main" xmlns="" w="9525">
+                <a14:hiddenLine xmlns="" xmlns:a14="http://schemas.microsoft.com/office/drawing/2010/main" w="9525">
                   <a:solidFill>
                     <a:srgbClr val="000000"/>
                   </a:solidFill>
@@ -3214,7 +3225,7 @@
             </a:ln>
             <a:extLst>
               <a:ext uri="{91240B29-F687-4f45-9708-019B960494DF}">
-                <a14:hiddenLine xmlns:a14="http://schemas.microsoft.com/office/drawing/2010/main" xmlns="" w="9525">
+                <a14:hiddenLine xmlns="" xmlns:a14="http://schemas.microsoft.com/office/drawing/2010/main" w="9525">
                   <a:solidFill>
                     <a:srgbClr val="000000"/>
                   </a:solidFill>
@@ -3279,7 +3290,7 @@
             </a:ln>
             <a:extLst>
               <a:ext uri="{91240B29-F687-4f45-9708-019B960494DF}">
-                <a14:hiddenLine xmlns:a14="http://schemas.microsoft.com/office/drawing/2010/main" xmlns="" w="9525">
+                <a14:hiddenLine xmlns="" xmlns:a14="http://schemas.microsoft.com/office/drawing/2010/main" w="9525">
                   <a:solidFill>
                     <a:srgbClr val="000000"/>
                   </a:solidFill>
@@ -3369,7 +3380,7 @@
             </a:ln>
             <a:extLst>
               <a:ext uri="{91240B29-F687-4f45-9708-019B960494DF}">
-                <a14:hiddenLine xmlns:a14="http://schemas.microsoft.com/office/drawing/2010/main" xmlns="" w="9525">
+                <a14:hiddenLine xmlns="" xmlns:a14="http://schemas.microsoft.com/office/drawing/2010/main" w="9525">
                   <a:solidFill>
                     <a:srgbClr val="000000"/>
                   </a:solidFill>
@@ -3431,7 +3442,7 @@
             </a:ln>
             <a:extLst>
               <a:ext uri="{91240B29-F687-4f45-9708-019B960494DF}">
-                <a14:hiddenLine xmlns:a14="http://schemas.microsoft.com/office/drawing/2010/main" xmlns="" w="9525">
+                <a14:hiddenLine xmlns="" xmlns:a14="http://schemas.microsoft.com/office/drawing/2010/main" w="9525">
                   <a:solidFill>
                     <a:srgbClr val="000000"/>
                   </a:solidFill>
@@ -3521,7 +3532,7 @@
             </a:ln>
             <a:extLst>
               <a:ext uri="{91240B29-F687-4f45-9708-019B960494DF}">
-                <a14:hiddenLine xmlns:a14="http://schemas.microsoft.com/office/drawing/2010/main" xmlns="" w="9525">
+                <a14:hiddenLine xmlns="" xmlns:a14="http://schemas.microsoft.com/office/drawing/2010/main" w="9525">
                   <a:solidFill>
                     <a:srgbClr val="000000"/>
                   </a:solidFill>
@@ -3611,7 +3622,7 @@
             </a:ln>
             <a:extLst>
               <a:ext uri="{91240B29-F687-4f45-9708-019B960494DF}">
-                <a14:hiddenLine xmlns:a14="http://schemas.microsoft.com/office/drawing/2010/main" xmlns="" w="9525">
+                <a14:hiddenLine xmlns="" xmlns:a14="http://schemas.microsoft.com/office/drawing/2010/main" w="9525">
                   <a:solidFill>
                     <a:srgbClr val="000000"/>
                   </a:solidFill>
@@ -3676,7 +3687,7 @@
             </a:ln>
             <a:extLst>
               <a:ext uri="{91240B29-F687-4f45-9708-019B960494DF}">
-                <a14:hiddenLine xmlns:a14="http://schemas.microsoft.com/office/drawing/2010/main" xmlns="" w="9525">
+                <a14:hiddenLine xmlns="" xmlns:a14="http://schemas.microsoft.com/office/drawing/2010/main" w="9525">
                   <a:solidFill>
                     <a:srgbClr val="000000"/>
                   </a:solidFill>
@@ -3738,7 +3749,7 @@
             </a:ln>
             <a:extLst>
               <a:ext uri="{91240B29-F687-4f45-9708-019B960494DF}">
-                <a14:hiddenLine xmlns:a14="http://schemas.microsoft.com/office/drawing/2010/main" xmlns="" w="9525">
+                <a14:hiddenLine xmlns="" xmlns:a14="http://schemas.microsoft.com/office/drawing/2010/main" w="9525">
                   <a:solidFill>
                     <a:srgbClr val="000000"/>
                   </a:solidFill>
@@ -3828,7 +3839,7 @@
             </a:ln>
             <a:extLst>
               <a:ext uri="{91240B29-F687-4f45-9708-019B960494DF}">
-                <a14:hiddenLine xmlns:a14="http://schemas.microsoft.com/office/drawing/2010/main" xmlns="" w="9525">
+                <a14:hiddenLine xmlns="" xmlns:a14="http://schemas.microsoft.com/office/drawing/2010/main" w="9525">
                   <a:solidFill>
                     <a:srgbClr val="000000"/>
                   </a:solidFill>
@@ -3918,7 +3929,7 @@
             </a:ln>
             <a:extLst>
               <a:ext uri="{91240B29-F687-4f45-9708-019B960494DF}">
-                <a14:hiddenLine xmlns:a14="http://schemas.microsoft.com/office/drawing/2010/main" xmlns="" w="9525">
+                <a14:hiddenLine xmlns="" xmlns:a14="http://schemas.microsoft.com/office/drawing/2010/main" w="9525">
                   <a:solidFill>
                     <a:srgbClr val="000000"/>
                   </a:solidFill>
@@ -3980,7 +3991,7 @@
             </a:ln>
             <a:extLst>
               <a:ext uri="{91240B29-F687-4f45-9708-019B960494DF}">
-                <a14:hiddenLine xmlns:a14="http://schemas.microsoft.com/office/drawing/2010/main" xmlns="" w="9525">
+                <a14:hiddenLine xmlns="" xmlns:a14="http://schemas.microsoft.com/office/drawing/2010/main" w="9525">
                   <a:solidFill>
                     <a:srgbClr val="000000"/>
                   </a:solidFill>
@@ -4100,7 +4111,7 @@
             </a:ln>
             <a:extLst>
               <a:ext uri="{91240B29-F687-4f45-9708-019B960494DF}">
-                <a14:hiddenLine xmlns:a14="http://schemas.microsoft.com/office/drawing/2010/main" xmlns="" w="9525">
+                <a14:hiddenLine xmlns="" xmlns:a14="http://schemas.microsoft.com/office/drawing/2010/main" w="9525">
                   <a:solidFill>
                     <a:srgbClr val="000000"/>
                   </a:solidFill>
@@ -4168,7 +4179,7 @@
             </a:ln>
             <a:extLst>
               <a:ext uri="{91240B29-F687-4f45-9708-019B960494DF}">
-                <a14:hiddenLine xmlns:a14="http://schemas.microsoft.com/office/drawing/2010/main" xmlns="" w="9525">
+                <a14:hiddenLine xmlns="" xmlns:a14="http://schemas.microsoft.com/office/drawing/2010/main" w="9525">
                   <a:solidFill>
                     <a:srgbClr val="000000"/>
                   </a:solidFill>
@@ -4258,7 +4269,7 @@
             </a:ln>
             <a:extLst>
               <a:ext uri="{91240B29-F687-4f45-9708-019B960494DF}">
-                <a14:hiddenLine xmlns:a14="http://schemas.microsoft.com/office/drawing/2010/main" xmlns="" w="9525">
+                <a14:hiddenLine xmlns="" xmlns:a14="http://schemas.microsoft.com/office/drawing/2010/main" w="9525">
                   <a:solidFill>
                     <a:srgbClr val="000000"/>
                   </a:solidFill>
@@ -4398,7 +4409,7 @@
           <a:p>
             <a:fld id="{BC4C8A1E-6DEB-4E79-A34E-FC8E3899C248}" type="datetimeFigureOut">
               <a:rPr lang="es-CO" smtClean="0"/>
-              <a:t>16/08/2017</a:t>
+              <a:t>22/11/2017</a:t>
             </a:fld>
             <a:endParaRPr lang="es-CO" dirty="0"/>
           </a:p>
@@ -4665,7 +4676,7 @@
           <a:p>
             <a:fld id="{BC4C8A1E-6DEB-4E79-A34E-FC8E3899C248}" type="datetimeFigureOut">
               <a:rPr lang="es-CO" smtClean="0"/>
-              <a:t>16/08/2017</a:t>
+              <a:t>22/11/2017</a:t>
             </a:fld>
             <a:endParaRPr lang="es-CO" dirty="0"/>
           </a:p>
@@ -4861,7 +4872,7 @@
           <a:p>
             <a:fld id="{BC4C8A1E-6DEB-4E79-A34E-FC8E3899C248}" type="datetimeFigureOut">
               <a:rPr lang="es-CO" smtClean="0"/>
-              <a:t>16/08/2017</a:t>
+              <a:t>22/11/2017</a:t>
             </a:fld>
             <a:endParaRPr lang="es-CO" dirty="0"/>
           </a:p>
@@ -5124,7 +5135,7 @@
           <a:p>
             <a:fld id="{BC4C8A1E-6DEB-4E79-A34E-FC8E3899C248}" type="datetimeFigureOut">
               <a:rPr lang="es-CO" smtClean="0"/>
-              <a:t>16/08/2017</a:t>
+              <a:t>22/11/2017</a:t>
             </a:fld>
             <a:endParaRPr lang="es-CO" dirty="0"/>
           </a:p>
@@ -5558,7 +5569,7 @@
           <a:p>
             <a:fld id="{BC4C8A1E-6DEB-4E79-A34E-FC8E3899C248}" type="datetimeFigureOut">
               <a:rPr lang="es-CO" smtClean="0"/>
-              <a:t>16/08/2017</a:t>
+              <a:t>22/11/2017</a:t>
             </a:fld>
             <a:endParaRPr lang="es-CO" dirty="0"/>
           </a:p>
@@ -6104,7 +6115,7 @@
           <a:p>
             <a:fld id="{BC4C8A1E-6DEB-4E79-A34E-FC8E3899C248}" type="datetimeFigureOut">
               <a:rPr lang="es-CO" smtClean="0"/>
-              <a:t>16/08/2017</a:t>
+              <a:t>22/11/2017</a:t>
             </a:fld>
             <a:endParaRPr lang="es-CO" dirty="0"/>
           </a:p>
@@ -6824,7 +6835,7 @@
           <a:p>
             <a:fld id="{BC4C8A1E-6DEB-4E79-A34E-FC8E3899C248}" type="datetimeFigureOut">
               <a:rPr lang="es-CO" smtClean="0"/>
-              <a:t>16/08/2017</a:t>
+              <a:t>22/11/2017</a:t>
             </a:fld>
             <a:endParaRPr lang="es-CO" dirty="0"/>
           </a:p>
@@ -6994,7 +7005,7 @@
           <a:p>
             <a:fld id="{BC4C8A1E-6DEB-4E79-A34E-FC8E3899C248}" type="datetimeFigureOut">
               <a:rPr lang="es-CO" smtClean="0"/>
-              <a:t>16/08/2017</a:t>
+              <a:t>22/11/2017</a:t>
             </a:fld>
             <a:endParaRPr lang="es-CO" dirty="0"/>
           </a:p>
@@ -7174,7 +7185,7 @@
           <a:p>
             <a:fld id="{BC4C8A1E-6DEB-4E79-A34E-FC8E3899C248}" type="datetimeFigureOut">
               <a:rPr lang="es-CO" smtClean="0"/>
-              <a:t>16/08/2017</a:t>
+              <a:t>22/11/2017</a:t>
             </a:fld>
             <a:endParaRPr lang="es-CO" dirty="0"/>
           </a:p>
@@ -7344,7 +7355,7 @@
           <a:p>
             <a:fld id="{BC4C8A1E-6DEB-4E79-A34E-FC8E3899C248}" type="datetimeFigureOut">
               <a:rPr lang="es-CO" smtClean="0"/>
-              <a:t>16/08/2017</a:t>
+              <a:t>22/11/2017</a:t>
             </a:fld>
             <a:endParaRPr lang="es-CO" dirty="0"/>
           </a:p>
@@ -7594,7 +7605,7 @@
           <a:p>
             <a:fld id="{BC4C8A1E-6DEB-4E79-A34E-FC8E3899C248}" type="datetimeFigureOut">
               <a:rPr lang="es-CO" smtClean="0"/>
-              <a:t>16/08/2017</a:t>
+              <a:t>22/11/2017</a:t>
             </a:fld>
             <a:endParaRPr lang="es-CO" dirty="0"/>
           </a:p>
@@ -7826,7 +7837,7 @@
           <a:p>
             <a:fld id="{BC4C8A1E-6DEB-4E79-A34E-FC8E3899C248}" type="datetimeFigureOut">
               <a:rPr lang="es-CO" smtClean="0"/>
-              <a:t>16/08/2017</a:t>
+              <a:t>22/11/2017</a:t>
             </a:fld>
             <a:endParaRPr lang="es-CO" dirty="0"/>
           </a:p>
@@ -8207,7 +8218,7 @@
           <a:p>
             <a:fld id="{BC4C8A1E-6DEB-4E79-A34E-FC8E3899C248}" type="datetimeFigureOut">
               <a:rPr lang="es-CO" smtClean="0"/>
-              <a:t>16/08/2017</a:t>
+              <a:t>22/11/2017</a:t>
             </a:fld>
             <a:endParaRPr lang="es-CO" dirty="0"/>
           </a:p>
@@ -8325,7 +8336,7 @@
           <a:p>
             <a:fld id="{BC4C8A1E-6DEB-4E79-A34E-FC8E3899C248}" type="datetimeFigureOut">
               <a:rPr lang="es-CO" smtClean="0"/>
-              <a:t>16/08/2017</a:t>
+              <a:t>22/11/2017</a:t>
             </a:fld>
             <a:endParaRPr lang="es-CO" dirty="0"/>
           </a:p>
@@ -8420,7 +8431,7 @@
           <a:p>
             <a:fld id="{BC4C8A1E-6DEB-4E79-A34E-FC8E3899C248}" type="datetimeFigureOut">
               <a:rPr lang="es-CO" smtClean="0"/>
-              <a:t>16/08/2017</a:t>
+              <a:t>22/11/2017</a:t>
             </a:fld>
             <a:endParaRPr lang="es-CO" dirty="0"/>
           </a:p>
@@ -8669,7 +8680,7 @@
           <a:p>
             <a:fld id="{BC4C8A1E-6DEB-4E79-A34E-FC8E3899C248}" type="datetimeFigureOut">
               <a:rPr lang="es-CO" smtClean="0"/>
-              <a:t>16/08/2017</a:t>
+              <a:t>22/11/2017</a:t>
             </a:fld>
             <a:endParaRPr lang="es-CO" dirty="0"/>
           </a:p>
@@ -8949,7 +8960,7 @@
           <a:p>
             <a:fld id="{BC4C8A1E-6DEB-4E79-A34E-FC8E3899C248}" type="datetimeFigureOut">
               <a:rPr lang="es-CO" smtClean="0"/>
-              <a:t>16/08/2017</a:t>
+              <a:t>22/11/2017</a:t>
             </a:fld>
             <a:endParaRPr lang="es-CO" dirty="0"/>
           </a:p>
@@ -9072,7 +9083,7 @@
           <a:noFill/>
           <a:extLst>
             <a:ext uri="{909E8E84-426E-40dd-AFC4-6F175D3DCCD1}">
-              <a14:hiddenFill xmlns:a14="http://schemas.microsoft.com/office/drawing/2010/main" xmlns="">
+              <a14:hiddenFill xmlns="" xmlns:a14="http://schemas.microsoft.com/office/drawing/2010/main">
                 <a:solidFill>
                   <a:srgbClr val="FFFFFF"/>
                 </a:solidFill>
@@ -9146,7 +9157,7 @@
               </a:ln>
               <a:extLst>
                 <a:ext uri="{91240B29-F687-4f45-9708-019B960494DF}">
-                  <a14:hiddenLine xmlns:a14="http://schemas.microsoft.com/office/drawing/2010/main" xmlns="" w="9525">
+                  <a14:hiddenLine xmlns="" xmlns:a14="http://schemas.microsoft.com/office/drawing/2010/main" w="9525">
                     <a:solidFill>
                       <a:srgbClr val="000000"/>
                     </a:solidFill>
@@ -9236,7 +9247,7 @@
               </a:ln>
               <a:extLst>
                 <a:ext uri="{91240B29-F687-4f45-9708-019B960494DF}">
-                  <a14:hiddenLine xmlns:a14="http://schemas.microsoft.com/office/drawing/2010/main" xmlns="" w="9525">
+                  <a14:hiddenLine xmlns="" xmlns:a14="http://schemas.microsoft.com/office/drawing/2010/main" w="9525">
                     <a:solidFill>
                       <a:srgbClr val="000000"/>
                     </a:solidFill>
@@ -9326,7 +9337,7 @@
               </a:ln>
               <a:extLst>
                 <a:ext uri="{91240B29-F687-4f45-9708-019B960494DF}">
-                  <a14:hiddenLine xmlns:a14="http://schemas.microsoft.com/office/drawing/2010/main" xmlns="" w="9525">
+                  <a14:hiddenLine xmlns="" xmlns:a14="http://schemas.microsoft.com/office/drawing/2010/main" w="9525">
                     <a:solidFill>
                       <a:srgbClr val="000000"/>
                     </a:solidFill>
@@ -9388,7 +9399,7 @@
               </a:ln>
               <a:extLst>
                 <a:ext uri="{91240B29-F687-4f45-9708-019B960494DF}">
-                  <a14:hiddenLine xmlns:a14="http://schemas.microsoft.com/office/drawing/2010/main" xmlns="" w="9525">
+                  <a14:hiddenLine xmlns="" xmlns:a14="http://schemas.microsoft.com/office/drawing/2010/main" w="9525">
                     <a:solidFill>
                       <a:srgbClr val="000000"/>
                     </a:solidFill>
@@ -9478,7 +9489,7 @@
               </a:ln>
               <a:extLst>
                 <a:ext uri="{91240B29-F687-4f45-9708-019B960494DF}">
-                  <a14:hiddenLine xmlns:a14="http://schemas.microsoft.com/office/drawing/2010/main" xmlns="" w="9525">
+                  <a14:hiddenLine xmlns="" xmlns:a14="http://schemas.microsoft.com/office/drawing/2010/main" w="9525">
                     <a:solidFill>
                       <a:srgbClr val="000000"/>
                     </a:solidFill>
@@ -9540,7 +9551,7 @@
               </a:ln>
               <a:extLst>
                 <a:ext uri="{91240B29-F687-4f45-9708-019B960494DF}">
-                  <a14:hiddenLine xmlns:a14="http://schemas.microsoft.com/office/drawing/2010/main" xmlns="" w="9525">
+                  <a14:hiddenLine xmlns="" xmlns:a14="http://schemas.microsoft.com/office/drawing/2010/main" w="9525">
                     <a:solidFill>
                       <a:srgbClr val="000000"/>
                     </a:solidFill>
@@ -9602,7 +9613,7 @@
               </a:ln>
               <a:extLst>
                 <a:ext uri="{91240B29-F687-4f45-9708-019B960494DF}">
-                  <a14:hiddenLine xmlns:a14="http://schemas.microsoft.com/office/drawing/2010/main" xmlns="" w="9525">
+                  <a14:hiddenLine xmlns="" xmlns:a14="http://schemas.microsoft.com/office/drawing/2010/main" w="9525">
                     <a:solidFill>
                       <a:srgbClr val="000000"/>
                     </a:solidFill>
@@ -9692,7 +9703,7 @@
               </a:ln>
               <a:extLst>
                 <a:ext uri="{91240B29-F687-4f45-9708-019B960494DF}">
-                  <a14:hiddenLine xmlns:a14="http://schemas.microsoft.com/office/drawing/2010/main" xmlns="" w="9525">
+                  <a14:hiddenLine xmlns="" xmlns:a14="http://schemas.microsoft.com/office/drawing/2010/main" w="9525">
                     <a:solidFill>
                       <a:srgbClr val="000000"/>
                     </a:solidFill>
@@ -9782,7 +9793,7 @@
               </a:ln>
               <a:extLst>
                 <a:ext uri="{91240B29-F687-4f45-9708-019B960494DF}">
-                  <a14:hiddenLine xmlns:a14="http://schemas.microsoft.com/office/drawing/2010/main" xmlns="" w="9525">
+                  <a14:hiddenLine xmlns="" xmlns:a14="http://schemas.microsoft.com/office/drawing/2010/main" w="9525">
                     <a:solidFill>
                       <a:srgbClr val="000000"/>
                     </a:solidFill>
@@ -9844,7 +9855,7 @@
               </a:ln>
               <a:extLst>
                 <a:ext uri="{91240B29-F687-4f45-9708-019B960494DF}">
-                  <a14:hiddenLine xmlns:a14="http://schemas.microsoft.com/office/drawing/2010/main" xmlns="" w="9525">
+                  <a14:hiddenLine xmlns="" xmlns:a14="http://schemas.microsoft.com/office/drawing/2010/main" w="9525">
                     <a:solidFill>
                       <a:srgbClr val="000000"/>
                     </a:solidFill>
@@ -9954,7 +9965,7 @@
               </a:ln>
               <a:extLst>
                 <a:ext uri="{91240B29-F687-4f45-9708-019B960494DF}">
-                  <a14:hiddenLine xmlns:a14="http://schemas.microsoft.com/office/drawing/2010/main" xmlns="" w="9525">
+                  <a14:hiddenLine xmlns="" xmlns:a14="http://schemas.microsoft.com/office/drawing/2010/main" w="9525">
                     <a:solidFill>
                       <a:srgbClr val="000000"/>
                     </a:solidFill>
@@ -10038,7 +10049,7 @@
               </a:ln>
               <a:extLst>
                 <a:ext uri="{91240B29-F687-4f45-9708-019B960494DF}">
-                  <a14:hiddenLine xmlns:a14="http://schemas.microsoft.com/office/drawing/2010/main" xmlns="" w="9525">
+                  <a14:hiddenLine xmlns="" xmlns:a14="http://schemas.microsoft.com/office/drawing/2010/main" w="9525">
                     <a:solidFill>
                       <a:srgbClr val="000000"/>
                     </a:solidFill>
@@ -10100,7 +10111,7 @@
               </a:ln>
               <a:extLst>
                 <a:ext uri="{91240B29-F687-4f45-9708-019B960494DF}">
-                  <a14:hiddenLine xmlns:a14="http://schemas.microsoft.com/office/drawing/2010/main" xmlns="" w="9525">
+                  <a14:hiddenLine xmlns="" xmlns:a14="http://schemas.microsoft.com/office/drawing/2010/main" w="9525">
                     <a:solidFill>
                       <a:srgbClr val="000000"/>
                     </a:solidFill>
@@ -10162,7 +10173,7 @@
               </a:ln>
               <a:extLst>
                 <a:ext uri="{91240B29-F687-4f45-9708-019B960494DF}">
-                  <a14:hiddenLine xmlns:a14="http://schemas.microsoft.com/office/drawing/2010/main" xmlns="" w="9525">
+                  <a14:hiddenLine xmlns="" xmlns:a14="http://schemas.microsoft.com/office/drawing/2010/main" w="9525">
                     <a:solidFill>
                       <a:srgbClr val="000000"/>
                     </a:solidFill>
@@ -10252,7 +10263,7 @@
               </a:ln>
               <a:extLst>
                 <a:ext uri="{91240B29-F687-4f45-9708-019B960494DF}">
-                  <a14:hiddenLine xmlns:a14="http://schemas.microsoft.com/office/drawing/2010/main" xmlns="" w="9525">
+                  <a14:hiddenLine xmlns="" xmlns:a14="http://schemas.microsoft.com/office/drawing/2010/main" w="9525">
                     <a:solidFill>
                       <a:srgbClr val="000000"/>
                     </a:solidFill>
@@ -10286,7 +10297,7 @@
               </a:ln>
               <a:extLst>
                 <a:ext uri="{91240B29-F687-4f45-9708-019B960494DF}">
-                  <a14:hiddenLine xmlns:a14="http://schemas.microsoft.com/office/drawing/2010/main" xmlns="" w="9525">
+                  <a14:hiddenLine xmlns="" xmlns:a14="http://schemas.microsoft.com/office/drawing/2010/main" w="9525">
                     <a:solidFill>
                       <a:srgbClr val="000000"/>
                     </a:solidFill>
@@ -10351,7 +10362,7 @@
               </a:ln>
               <a:extLst>
                 <a:ext uri="{91240B29-F687-4f45-9708-019B960494DF}">
-                  <a14:hiddenLine xmlns:a14="http://schemas.microsoft.com/office/drawing/2010/main" xmlns="" w="9525">
+                  <a14:hiddenLine xmlns="" xmlns:a14="http://schemas.microsoft.com/office/drawing/2010/main" w="9525">
                     <a:solidFill>
                       <a:srgbClr val="000000"/>
                     </a:solidFill>
@@ -10441,7 +10452,7 @@
               </a:ln>
               <a:extLst>
                 <a:ext uri="{91240B29-F687-4f45-9708-019B960494DF}">
-                  <a14:hiddenLine xmlns:a14="http://schemas.microsoft.com/office/drawing/2010/main" xmlns="" w="9525">
+                  <a14:hiddenLine xmlns="" xmlns:a14="http://schemas.microsoft.com/office/drawing/2010/main" w="9525">
                     <a:solidFill>
                       <a:srgbClr val="000000"/>
                     </a:solidFill>
@@ -10503,7 +10514,7 @@
               </a:ln>
               <a:extLst>
                 <a:ext uri="{91240B29-F687-4f45-9708-019B960494DF}">
-                  <a14:hiddenLine xmlns:a14="http://schemas.microsoft.com/office/drawing/2010/main" xmlns="" w="9525">
+                  <a14:hiddenLine xmlns="" xmlns:a14="http://schemas.microsoft.com/office/drawing/2010/main" w="9525">
                     <a:solidFill>
                       <a:srgbClr val="000000"/>
                     </a:solidFill>
@@ -10593,7 +10604,7 @@
               </a:ln>
               <a:extLst>
                 <a:ext uri="{91240B29-F687-4f45-9708-019B960494DF}">
-                  <a14:hiddenLine xmlns:a14="http://schemas.microsoft.com/office/drawing/2010/main" xmlns="" w="9525">
+                  <a14:hiddenLine xmlns="" xmlns:a14="http://schemas.microsoft.com/office/drawing/2010/main" w="9525">
                     <a:solidFill>
                       <a:srgbClr val="000000"/>
                     </a:solidFill>
@@ -10658,7 +10669,7 @@
               </a:ln>
               <a:extLst>
                 <a:ext uri="{91240B29-F687-4f45-9708-019B960494DF}">
-                  <a14:hiddenLine xmlns:a14="http://schemas.microsoft.com/office/drawing/2010/main" xmlns="" w="9525">
+                  <a14:hiddenLine xmlns="" xmlns:a14="http://schemas.microsoft.com/office/drawing/2010/main" w="9525">
                     <a:solidFill>
                       <a:srgbClr val="000000"/>
                     </a:solidFill>
@@ -10720,7 +10731,7 @@
               </a:ln>
               <a:extLst>
                 <a:ext uri="{91240B29-F687-4f45-9708-019B960494DF}">
-                  <a14:hiddenLine xmlns:a14="http://schemas.microsoft.com/office/drawing/2010/main" xmlns="" w="9525">
+                  <a14:hiddenLine xmlns="" xmlns:a14="http://schemas.microsoft.com/office/drawing/2010/main" w="9525">
                     <a:solidFill>
                       <a:srgbClr val="000000"/>
                     </a:solidFill>
@@ -10810,7 +10821,7 @@
               </a:ln>
               <a:extLst>
                 <a:ext uri="{91240B29-F687-4f45-9708-019B960494DF}">
-                  <a14:hiddenLine xmlns:a14="http://schemas.microsoft.com/office/drawing/2010/main" xmlns="" w="9525">
+                  <a14:hiddenLine xmlns="" xmlns:a14="http://schemas.microsoft.com/office/drawing/2010/main" w="9525">
                     <a:solidFill>
                       <a:srgbClr val="000000"/>
                     </a:solidFill>
@@ -10900,7 +10911,7 @@
               </a:ln>
               <a:extLst>
                 <a:ext uri="{91240B29-F687-4f45-9708-019B960494DF}">
-                  <a14:hiddenLine xmlns:a14="http://schemas.microsoft.com/office/drawing/2010/main" xmlns="" w="9525">
+                  <a14:hiddenLine xmlns="" xmlns:a14="http://schemas.microsoft.com/office/drawing/2010/main" w="9525">
                     <a:solidFill>
                       <a:srgbClr val="000000"/>
                     </a:solidFill>
@@ -10965,7 +10976,7 @@
               </a:ln>
               <a:extLst>
                 <a:ext uri="{91240B29-F687-4f45-9708-019B960494DF}">
-                  <a14:hiddenLine xmlns:a14="http://schemas.microsoft.com/office/drawing/2010/main" xmlns="" w="9525">
+                  <a14:hiddenLine xmlns="" xmlns:a14="http://schemas.microsoft.com/office/drawing/2010/main" w="9525">
                     <a:solidFill>
                       <a:srgbClr val="000000"/>
                     </a:solidFill>
@@ -11085,7 +11096,7 @@
               </a:ln>
               <a:extLst>
                 <a:ext uri="{91240B29-F687-4f45-9708-019B960494DF}">
-                  <a14:hiddenLine xmlns:a14="http://schemas.microsoft.com/office/drawing/2010/main" xmlns="" w="9525">
+                  <a14:hiddenLine xmlns="" xmlns:a14="http://schemas.microsoft.com/office/drawing/2010/main" w="9525">
                     <a:solidFill>
                       <a:srgbClr val="000000"/>
                     </a:solidFill>
@@ -11166,7 +11177,7 @@
               </a:ln>
               <a:extLst>
                 <a:ext uri="{91240B29-F687-4f45-9708-019B960494DF}">
-                  <a14:hiddenLine xmlns:a14="http://schemas.microsoft.com/office/drawing/2010/main" xmlns="" w="9525">
+                  <a14:hiddenLine xmlns="" xmlns:a14="http://schemas.microsoft.com/office/drawing/2010/main" w="9525">
                     <a:solidFill>
                       <a:srgbClr val="000000"/>
                     </a:solidFill>
@@ -11281,7 +11292,7 @@
               </a:ln>
               <a:extLst>
                 <a:ext uri="{91240B29-F687-4f45-9708-019B960494DF}">
-                  <a14:hiddenLine xmlns:a14="http://schemas.microsoft.com/office/drawing/2010/main" xmlns="" w="9525">
+                  <a14:hiddenLine xmlns="" xmlns:a14="http://schemas.microsoft.com/office/drawing/2010/main" w="9525">
                     <a:solidFill>
                       <a:srgbClr val="000000"/>
                     </a:solidFill>
@@ -11371,7 +11382,7 @@
               </a:ln>
               <a:extLst>
                 <a:ext uri="{91240B29-F687-4f45-9708-019B960494DF}">
-                  <a14:hiddenLine xmlns:a14="http://schemas.microsoft.com/office/drawing/2010/main" xmlns="" w="9525">
+                  <a14:hiddenLine xmlns="" xmlns:a14="http://schemas.microsoft.com/office/drawing/2010/main" w="9525">
                     <a:solidFill>
                       <a:srgbClr val="000000"/>
                     </a:solidFill>
@@ -11436,7 +11447,7 @@
               </a:ln>
               <a:extLst>
                 <a:ext uri="{91240B29-F687-4f45-9708-019B960494DF}">
-                  <a14:hiddenLine xmlns:a14="http://schemas.microsoft.com/office/drawing/2010/main" xmlns="" w="9525">
+                  <a14:hiddenLine xmlns="" xmlns:a14="http://schemas.microsoft.com/office/drawing/2010/main" w="9525">
                     <a:solidFill>
                       <a:srgbClr val="000000"/>
                     </a:solidFill>
@@ -11526,7 +11537,7 @@
               </a:ln>
               <a:extLst>
                 <a:ext uri="{91240B29-F687-4f45-9708-019B960494DF}">
-                  <a14:hiddenLine xmlns:a14="http://schemas.microsoft.com/office/drawing/2010/main" xmlns="" w="9525">
+                  <a14:hiddenLine xmlns="" xmlns:a14="http://schemas.microsoft.com/office/drawing/2010/main" w="9525">
                     <a:solidFill>
                       <a:srgbClr val="000000"/>
                     </a:solidFill>
@@ -11594,7 +11605,7 @@
               </a:ln>
               <a:extLst>
                 <a:ext uri="{91240B29-F687-4f45-9708-019B960494DF}">
-                  <a14:hiddenLine xmlns:a14="http://schemas.microsoft.com/office/drawing/2010/main" xmlns="" w="9525">
+                  <a14:hiddenLine xmlns="" xmlns:a14="http://schemas.microsoft.com/office/drawing/2010/main" w="9525">
                     <a:solidFill>
                       <a:srgbClr val="000000"/>
                     </a:solidFill>
@@ -11684,7 +11695,7 @@
               </a:ln>
               <a:extLst>
                 <a:ext uri="{91240B29-F687-4f45-9708-019B960494DF}">
-                  <a14:hiddenLine xmlns:a14="http://schemas.microsoft.com/office/drawing/2010/main" xmlns="" w="9525">
+                  <a14:hiddenLine xmlns="" xmlns:a14="http://schemas.microsoft.com/office/drawing/2010/main" w="9525">
                     <a:solidFill>
                       <a:srgbClr val="000000"/>
                     </a:solidFill>
@@ -11752,7 +11763,7 @@
               </a:ln>
               <a:extLst>
                 <a:ext uri="{91240B29-F687-4f45-9708-019B960494DF}">
-                  <a14:hiddenLine xmlns:a14="http://schemas.microsoft.com/office/drawing/2010/main" xmlns="" w="9525">
+                  <a14:hiddenLine xmlns="" xmlns:a14="http://schemas.microsoft.com/office/drawing/2010/main" w="9525">
                     <a:solidFill>
                       <a:srgbClr val="000000"/>
                     </a:solidFill>
@@ -11842,7 +11853,7 @@
               </a:ln>
               <a:extLst>
                 <a:ext uri="{91240B29-F687-4f45-9708-019B960494DF}">
-                  <a14:hiddenLine xmlns:a14="http://schemas.microsoft.com/office/drawing/2010/main" xmlns="" w="9525">
+                  <a14:hiddenLine xmlns="" xmlns:a14="http://schemas.microsoft.com/office/drawing/2010/main" w="9525">
                     <a:solidFill>
                       <a:srgbClr val="000000"/>
                     </a:solidFill>
@@ -11876,7 +11887,7 @@
               </a:ln>
               <a:extLst>
                 <a:ext uri="{91240B29-F687-4f45-9708-019B960494DF}">
-                  <a14:hiddenLine xmlns:a14="http://schemas.microsoft.com/office/drawing/2010/main" xmlns="" w="9525">
+                  <a14:hiddenLine xmlns="" xmlns:a14="http://schemas.microsoft.com/office/drawing/2010/main" w="9525">
                     <a:solidFill>
                       <a:srgbClr val="000000"/>
                     </a:solidFill>
@@ -12016,7 +12027,7 @@
           <a:p>
             <a:fld id="{BC4C8A1E-6DEB-4E79-A34E-FC8E3899C248}" type="datetimeFigureOut">
               <a:rPr lang="es-CO" smtClean="0"/>
-              <a:t>16/08/2017</a:t>
+              <a:t>22/11/2017</a:t>
             </a:fld>
             <a:endParaRPr lang="es-CO" dirty="0"/>
           </a:p>
@@ -12507,6 +12518,96 @@
 </p:sld>
 </file>
 
+<file path=ppt/slides/slide10.xml><?xml version="1.0" encoding="utf-8"?>
+<p:sld xmlns:a="http://schemas.openxmlformats.org/drawingml/2006/main" xmlns:r="http://schemas.openxmlformats.org/officeDocument/2006/relationships" xmlns:p="http://schemas.openxmlformats.org/presentationml/2006/main">
+  <p:cSld>
+    <p:spTree>
+      <p:nvGrpSpPr>
+        <p:cNvPr id="1" name=""/>
+        <p:cNvGrpSpPr/>
+        <p:nvPr/>
+      </p:nvGrpSpPr>
+      <p:grpSpPr>
+        <a:xfrm>
+          <a:off x="0" y="0"/>
+          <a:ext cx="0" cy="0"/>
+          <a:chOff x="0" y="0"/>
+          <a:chExt cx="0" cy="0"/>
+        </a:xfrm>
+      </p:grpSpPr>
+    </p:spTree>
+    <p:extLst>
+      <p:ext uri="{BB962C8B-B14F-4D97-AF65-F5344CB8AC3E}">
+        <p14:creationId xmlns:p14="http://schemas.microsoft.com/office/powerpoint/2010/main" val="3118896279"/>
+      </p:ext>
+    </p:extLst>
+  </p:cSld>
+  <p:clrMapOvr>
+    <a:masterClrMapping/>
+  </p:clrMapOvr>
+</p:sld>
+</file>
+
+<file path=ppt/slides/slide11.xml><?xml version="1.0" encoding="utf-8"?>
+<p:sld xmlns:a="http://schemas.openxmlformats.org/drawingml/2006/main" xmlns:r="http://schemas.openxmlformats.org/officeDocument/2006/relationships" xmlns:p="http://schemas.openxmlformats.org/presentationml/2006/main">
+  <p:cSld>
+    <p:spTree>
+      <p:nvGrpSpPr>
+        <p:cNvPr id="1" name=""/>
+        <p:cNvGrpSpPr/>
+        <p:nvPr/>
+      </p:nvGrpSpPr>
+      <p:grpSpPr>
+        <a:xfrm>
+          <a:off x="0" y="0"/>
+          <a:ext cx="0" cy="0"/>
+          <a:chOff x="0" y="0"/>
+          <a:chExt cx="0" cy="0"/>
+        </a:xfrm>
+      </p:grpSpPr>
+    </p:spTree>
+    <p:extLst>
+      <p:ext uri="{BB962C8B-B14F-4D97-AF65-F5344CB8AC3E}">
+        <p14:creationId xmlns:p14="http://schemas.microsoft.com/office/powerpoint/2010/main" val="1269747764"/>
+      </p:ext>
+    </p:extLst>
+  </p:cSld>
+  <p:clrMapOvr>
+    <a:masterClrMapping/>
+  </p:clrMapOvr>
+</p:sld>
+</file>
+
+<file path=ppt/slides/slide12.xml><?xml version="1.0" encoding="utf-8"?>
+<p:sld xmlns:a="http://schemas.openxmlformats.org/drawingml/2006/main" xmlns:r="http://schemas.openxmlformats.org/officeDocument/2006/relationships" xmlns:p="http://schemas.openxmlformats.org/presentationml/2006/main">
+  <p:cSld>
+    <p:spTree>
+      <p:nvGrpSpPr>
+        <p:cNvPr id="1" name=""/>
+        <p:cNvGrpSpPr/>
+        <p:nvPr/>
+      </p:nvGrpSpPr>
+      <p:grpSpPr>
+        <a:xfrm>
+          <a:off x="0" y="0"/>
+          <a:ext cx="0" cy="0"/>
+          <a:chOff x="0" y="0"/>
+          <a:chExt cx="0" cy="0"/>
+        </a:xfrm>
+      </p:grpSpPr>
+    </p:spTree>
+    <p:extLst>
+      <p:ext uri="{BB962C8B-B14F-4D97-AF65-F5344CB8AC3E}">
+        <p14:creationId xmlns:p14="http://schemas.microsoft.com/office/powerpoint/2010/main" val="1667654783"/>
+      </p:ext>
+    </p:extLst>
+  </p:cSld>
+  <p:clrMapOvr>
+    <a:masterClrMapping/>
+  </p:clrMapOvr>
+</p:sld>
+</file>
+
 <file path=ppt/slides/slide2.xml><?xml version="1.0" encoding="utf-8"?>
 <p:sld xmlns:a="http://schemas.openxmlformats.org/drawingml/2006/main" xmlns:r="http://schemas.openxmlformats.org/officeDocument/2006/relationships" xmlns:p="http://schemas.openxmlformats.org/presentationml/2006/main">
   <p:cSld>
@@ -12762,6 +12863,183 @@
 </file>
 
 <file path=ppt/slides/slide4.xml><?xml version="1.0" encoding="utf-8"?>
+<p:sld xmlns:a="http://schemas.openxmlformats.org/drawingml/2006/main" xmlns:r="http://schemas.openxmlformats.org/officeDocument/2006/relationships" xmlns:p="http://schemas.openxmlformats.org/presentationml/2006/main">
+  <p:cSld>
+    <p:spTree>
+      <p:nvGrpSpPr>
+        <p:cNvPr id="1" name=""/>
+        <p:cNvGrpSpPr/>
+        <p:nvPr/>
+      </p:nvGrpSpPr>
+      <p:grpSpPr>
+        <a:xfrm>
+          <a:off x="0" y="0"/>
+          <a:ext cx="0" cy="0"/>
+          <a:chOff x="0" y="0"/>
+          <a:chExt cx="0" cy="0"/>
+        </a:xfrm>
+      </p:grpSpPr>
+      <p:pic>
+        <p:nvPicPr>
+          <p:cNvPr id="4098" name="Picture 2" descr="http://static3.wikia.nocookie.net/__cb20110116010337/yugioh/images/1/15/5Dx143_More_Machine_Imperials.jpg">
+            <a:extLst>
+              <a:ext uri="{FF2B5EF4-FFF2-40B4-BE49-F238E27FC236}">
+                <a16:creationId xmlns:a16="http://schemas.microsoft.com/office/drawing/2014/main" id="{40259428-C317-446B-8080-48720AAE7560}"/>
+              </a:ext>
+            </a:extLst>
+          </p:cNvPr>
+          <p:cNvPicPr>
+            <a:picLocks noChangeAspect="1" noChangeArrowheads="1"/>
+          </p:cNvPicPr>
+          <p:nvPr/>
+        </p:nvPicPr>
+        <p:blipFill>
+          <a:blip r:embed="rId2">
+            <a:extLst>
+              <a:ext uri="{28A0092B-C50C-407E-A947-70E740481C1C}">
+                <a14:useLocalDpi xmlns:a14="http://schemas.microsoft.com/office/drawing/2010/main" val="0"/>
+              </a:ext>
+            </a:extLst>
+          </a:blip>
+          <a:srcRect/>
+          <a:stretch>
+            <a:fillRect/>
+          </a:stretch>
+        </p:blipFill>
+        <p:spPr bwMode="auto">
+          <a:xfrm>
+            <a:off x="1444488" y="801343"/>
+            <a:ext cx="9342783" cy="5255315"/>
+          </a:xfrm>
+          <a:prstGeom prst="rect">
+            <a:avLst/>
+          </a:prstGeom>
+          <a:noFill/>
+          <a:extLst>
+            <a:ext uri="{909E8E84-426E-40DD-AFC4-6F175D3DCCD1}">
+              <a14:hiddenFill xmlns:a14="http://schemas.microsoft.com/office/drawing/2010/main">
+                <a:solidFill>
+                  <a:srgbClr val="FFFFFF"/>
+                </a:solidFill>
+              </a14:hiddenFill>
+            </a:ext>
+          </a:extLst>
+        </p:spPr>
+      </p:pic>
+    </p:spTree>
+    <p:extLst>
+      <p:ext uri="{BB962C8B-B14F-4D97-AF65-F5344CB8AC3E}">
+        <p14:creationId xmlns:p14="http://schemas.microsoft.com/office/powerpoint/2010/main" val="1573209783"/>
+      </p:ext>
+    </p:extLst>
+  </p:cSld>
+  <p:clrMapOvr>
+    <a:masterClrMapping/>
+  </p:clrMapOvr>
+</p:sld>
+</file>
+
+<file path=ppt/slides/slide5.xml><?xml version="1.0" encoding="utf-8"?>
+<p:sld xmlns:a="http://schemas.openxmlformats.org/drawingml/2006/main" xmlns:r="http://schemas.openxmlformats.org/officeDocument/2006/relationships" xmlns:p="http://schemas.openxmlformats.org/presentationml/2006/main">
+  <p:cSld>
+    <p:spTree>
+      <p:nvGrpSpPr>
+        <p:cNvPr id="1" name=""/>
+        <p:cNvGrpSpPr/>
+        <p:nvPr/>
+      </p:nvGrpSpPr>
+      <p:grpSpPr>
+        <a:xfrm>
+          <a:off x="0" y="0"/>
+          <a:ext cx="0" cy="0"/>
+          <a:chOff x="0" y="0"/>
+          <a:chExt cx="0" cy="0"/>
+        </a:xfrm>
+      </p:grpSpPr>
+      <p:sp>
+        <p:nvSpPr>
+          <p:cNvPr id="2" name="Título 1">
+            <a:extLst>
+              <a:ext uri="{FF2B5EF4-FFF2-40B4-BE49-F238E27FC236}">
+                <a16:creationId xmlns:a16="http://schemas.microsoft.com/office/drawing/2014/main" id="{CA51F1C4-04AD-45D8-AFC9-7D1BA044FE79}"/>
+              </a:ext>
+            </a:extLst>
+          </p:cNvPr>
+          <p:cNvSpPr>
+            <a:spLocks noGrp="1"/>
+          </p:cNvSpPr>
+          <p:nvPr>
+            <p:ph type="title"/>
+          </p:nvPr>
+        </p:nvSpPr>
+        <p:spPr/>
+        <p:txBody>
+          <a:bodyPr/>
+          <a:lstStyle/>
+          <a:p>
+            <a:r>
+              <a:rPr lang="es-419" dirty="0"/>
+              <a:t>Objetivo del proyecto (actualizado)</a:t>
+            </a:r>
+            <a:endParaRPr lang="es-CO" dirty="0"/>
+          </a:p>
+        </p:txBody>
+      </p:sp>
+      <p:sp>
+        <p:nvSpPr>
+          <p:cNvPr id="7" name="Marcador de contenido 6">
+            <a:extLst>
+              <a:ext uri="{FF2B5EF4-FFF2-40B4-BE49-F238E27FC236}">
+                <a16:creationId xmlns:a16="http://schemas.microsoft.com/office/drawing/2014/main" id="{A445F72A-C96E-4BCF-9A2B-F80C4BB03EAC}"/>
+              </a:ext>
+            </a:extLst>
+          </p:cNvPr>
+          <p:cNvSpPr>
+            <a:spLocks noGrp="1"/>
+          </p:cNvSpPr>
+          <p:nvPr>
+            <p:ph sz="half" idx="1"/>
+          </p:nvPr>
+        </p:nvSpPr>
+        <p:spPr/>
+        <p:txBody>
+          <a:bodyPr/>
+          <a:lstStyle/>
+          <a:p>
+            <a:r>
+              <a:rPr lang="es-419" dirty="0"/>
+              <a:t>Identificar el numero de cartas en juego.</a:t>
+            </a:r>
+          </a:p>
+          <a:p>
+            <a:r>
+              <a:rPr lang="es-419" dirty="0"/>
+              <a:t>Identificar el tipo de cada carta en juego.</a:t>
+            </a:r>
+          </a:p>
+          <a:p>
+            <a:r>
+              <a:rPr lang="es-419" dirty="0"/>
+              <a:t>Identificar el estado de carta en juego.</a:t>
+            </a:r>
+            <a:endParaRPr lang="es-CO" dirty="0"/>
+          </a:p>
+        </p:txBody>
+      </p:sp>
+    </p:spTree>
+    <p:extLst>
+      <p:ext uri="{BB962C8B-B14F-4D97-AF65-F5344CB8AC3E}">
+        <p14:creationId xmlns:p14="http://schemas.microsoft.com/office/powerpoint/2010/main" val="3962530228"/>
+      </p:ext>
+    </p:extLst>
+  </p:cSld>
+  <p:clrMapOvr>
+    <a:masterClrMapping/>
+  </p:clrMapOvr>
+</p:sld>
+</file>
+
+<file path=ppt/slides/slide6.xml><?xml version="1.0" encoding="utf-8"?>
 <p:sld xmlns:a="http://schemas.openxmlformats.org/drawingml/2006/main" xmlns:r="http://schemas.openxmlformats.org/officeDocument/2006/relationships" xmlns:p="http://schemas.openxmlformats.org/presentationml/2006/main">
   <p:cSld>
     <p:spTree>
@@ -12970,7 +13248,7 @@
 </p:sld>
 </file>
 
-<file path=ppt/slides/slide5.xml><?xml version="1.0" encoding="utf-8"?>
+<file path=ppt/slides/slide7.xml><?xml version="1.0" encoding="utf-8"?>
 <p:sld xmlns:a="http://schemas.openxmlformats.org/drawingml/2006/main" xmlns:r="http://schemas.openxmlformats.org/officeDocument/2006/relationships" xmlns:p="http://schemas.openxmlformats.org/presentationml/2006/main">
   <p:cSld>
     <p:spTree>
@@ -12987,12 +13265,184 @@
           <a:chExt cx="0" cy="0"/>
         </a:xfrm>
       </p:grpSpPr>
+      <p:sp>
+        <p:nvSpPr>
+          <p:cNvPr id="2" name="Título 1">
+            <a:extLst>
+              <a:ext uri="{FF2B5EF4-FFF2-40B4-BE49-F238E27FC236}">
+                <a16:creationId xmlns:a16="http://schemas.microsoft.com/office/drawing/2014/main" id="{DE393132-8EA8-4CC3-9BE7-EAE9D44AA6A6}"/>
+              </a:ext>
+            </a:extLst>
+          </p:cNvPr>
+          <p:cNvSpPr>
+            <a:spLocks noGrp="1"/>
+          </p:cNvSpPr>
+          <p:nvPr>
+            <p:ph type="title"/>
+          </p:nvPr>
+        </p:nvSpPr>
+        <p:spPr/>
+        <p:txBody>
+          <a:bodyPr/>
+          <a:lstStyle/>
+          <a:p>
+            <a:r>
+              <a:rPr lang="es-419" dirty="0"/>
+              <a:t>Actividades realizadas</a:t>
+            </a:r>
+            <a:endParaRPr lang="es-CO" dirty="0"/>
+          </a:p>
+        </p:txBody>
+      </p:sp>
+      <p:sp>
+        <p:nvSpPr>
+          <p:cNvPr id="5" name="Marcador de contenido 4">
+            <a:extLst>
+              <a:ext uri="{FF2B5EF4-FFF2-40B4-BE49-F238E27FC236}">
+                <a16:creationId xmlns:a16="http://schemas.microsoft.com/office/drawing/2014/main" id="{69BBC922-4321-43BA-8274-724A9B9ACD52}"/>
+              </a:ext>
+            </a:extLst>
+          </p:cNvPr>
+          <p:cNvSpPr>
+            <a:spLocks noGrp="1"/>
+          </p:cNvSpPr>
+          <p:nvPr>
+            <p:ph sz="half" idx="2"/>
+          </p:nvPr>
+        </p:nvSpPr>
+        <p:spPr/>
+        <p:txBody>
+          <a:bodyPr/>
+          <a:lstStyle/>
+          <a:p>
+            <a:r>
+              <a:rPr lang="es-419" dirty="0"/>
+              <a:t>Binarizacion de la imagen.</a:t>
+            </a:r>
+          </a:p>
+          <a:p>
+            <a:r>
+              <a:rPr lang="es-419" dirty="0"/>
+              <a:t>Obtención de contornos.</a:t>
+            </a:r>
+          </a:p>
+          <a:p>
+            <a:r>
+              <a:rPr lang="es-419" dirty="0"/>
+              <a:t>Obtención de la orientación.</a:t>
+            </a:r>
+          </a:p>
+          <a:p>
+            <a:r>
+              <a:rPr lang="es-419" dirty="0"/>
+              <a:t>Identificación a partir de la orientación y posición en la imagen.</a:t>
+            </a:r>
+          </a:p>
+          <a:p>
+            <a:endParaRPr lang="es-CO" dirty="0"/>
+          </a:p>
+        </p:txBody>
+      </p:sp>
+    </p:spTree>
+    <p:extLst>
+      <p:ext uri="{BB962C8B-B14F-4D97-AF65-F5344CB8AC3E}">
+        <p14:creationId xmlns:p14="http://schemas.microsoft.com/office/powerpoint/2010/main" val="1574476627"/>
+      </p:ext>
+    </p:extLst>
+  </p:cSld>
+  <p:clrMapOvr>
+    <a:masterClrMapping/>
+  </p:clrMapOvr>
+</p:sld>
+</file>
+
+<file path=ppt/slides/slide8.xml><?xml version="1.0" encoding="utf-8"?>
+<p:sld xmlns:a="http://schemas.openxmlformats.org/drawingml/2006/main" xmlns:r="http://schemas.openxmlformats.org/officeDocument/2006/relationships" xmlns:p="http://schemas.openxmlformats.org/presentationml/2006/main">
+  <p:cSld>
+    <p:spTree>
+      <p:nvGrpSpPr>
+        <p:cNvPr id="1" name=""/>
+        <p:cNvGrpSpPr/>
+        <p:nvPr/>
+      </p:nvGrpSpPr>
+      <p:grpSpPr>
+        <a:xfrm>
+          <a:off x="0" y="0"/>
+          <a:ext cx="0" cy="0"/>
+          <a:chOff x="0" y="0"/>
+          <a:chExt cx="0" cy="0"/>
+        </a:xfrm>
+      </p:grpSpPr>
+      <p:sp>
+        <p:nvSpPr>
+          <p:cNvPr id="2" name="Título 1">
+            <a:extLst>
+              <a:ext uri="{FF2B5EF4-FFF2-40B4-BE49-F238E27FC236}">
+                <a16:creationId xmlns:a16="http://schemas.microsoft.com/office/drawing/2014/main" id="{B05B07E5-F364-4F80-96D1-B85EA66A4AB3}"/>
+              </a:ext>
+            </a:extLst>
+          </p:cNvPr>
+          <p:cNvSpPr>
+            <a:spLocks noGrp="1"/>
+          </p:cNvSpPr>
+          <p:nvPr>
+            <p:ph type="title"/>
+          </p:nvPr>
+        </p:nvSpPr>
+        <p:spPr/>
+        <p:txBody>
+          <a:bodyPr/>
+          <a:lstStyle/>
+          <a:p>
+            <a:r>
+              <a:rPr lang="es-419" dirty="0"/>
+              <a:t>dificultades</a:t>
+            </a:r>
+            <a:endParaRPr lang="es-CO" dirty="0"/>
+          </a:p>
+        </p:txBody>
+      </p:sp>
+      <p:sp>
+        <p:nvSpPr>
+          <p:cNvPr id="4" name="Marcador de contenido 3">
+            <a:extLst>
+              <a:ext uri="{FF2B5EF4-FFF2-40B4-BE49-F238E27FC236}">
+                <a16:creationId xmlns:a16="http://schemas.microsoft.com/office/drawing/2014/main" id="{A8209046-F2ED-4EB2-985F-295FCD6C8382}"/>
+              </a:ext>
+            </a:extLst>
+          </p:cNvPr>
+          <p:cNvSpPr>
+            <a:spLocks noGrp="1"/>
+          </p:cNvSpPr>
+          <p:nvPr>
+            <p:ph sz="half" idx="1"/>
+          </p:nvPr>
+        </p:nvSpPr>
+        <p:spPr/>
+        <p:txBody>
+          <a:bodyPr/>
+          <a:lstStyle/>
+          <a:p>
+            <a:r>
+              <a:rPr lang="es-419" dirty="0"/>
+              <a:t>Análisis de texto.</a:t>
+            </a:r>
+          </a:p>
+          <a:p>
+            <a:r>
+              <a:rPr lang="es-419" dirty="0"/>
+              <a:t>Análisis de figuras.</a:t>
+            </a:r>
+            <a:endParaRPr lang="es-CO" dirty="0"/>
+          </a:p>
+        </p:txBody>
+      </p:sp>
       <p:pic>
         <p:nvPicPr>
-          <p:cNvPr id="4098" name="Picture 2" descr="http://static3.wikia.nocookie.net/__cb20110116010337/yugioh/images/1/15/5Dx143_More_Machine_Imperials.jpg">
+          <p:cNvPr id="1026" name="Picture 2" descr="https://www.muypymes.com/images/stories/actualidad/texto.png">
             <a:extLst>
               <a:ext uri="{FF2B5EF4-FFF2-40B4-BE49-F238E27FC236}">
-                <a16:creationId xmlns:a16="http://schemas.microsoft.com/office/drawing/2014/main" id="{40259428-C317-446B-8080-48720AAE7560}"/>
+                <a16:creationId xmlns:a16="http://schemas.microsoft.com/office/drawing/2014/main" id="{50951E19-759F-4193-A11D-36DE57AC928E}"/>
               </a:ext>
             </a:extLst>
           </p:cNvPr>
@@ -13016,8 +13466,8 @@
         </p:blipFill>
         <p:spPr bwMode="auto">
           <a:xfrm>
-            <a:off x="1444488" y="801343"/>
-            <a:ext cx="9342783" cy="5255315"/>
+            <a:off x="6019799" y="2249486"/>
+            <a:ext cx="5208401" cy="3541713"/>
           </a:xfrm>
           <a:prstGeom prst="rect">
             <a:avLst/>
@@ -13037,7 +13487,7 @@
     </p:spTree>
     <p:extLst>
       <p:ext uri="{BB962C8B-B14F-4D97-AF65-F5344CB8AC3E}">
-        <p14:creationId xmlns:p14="http://schemas.microsoft.com/office/powerpoint/2010/main" val="1573209783"/>
+        <p14:creationId xmlns:p14="http://schemas.microsoft.com/office/powerpoint/2010/main" val="2481015139"/>
       </p:ext>
     </p:extLst>
   </p:cSld>
@@ -13047,7 +13497,7 @@
 </p:sld>
 </file>
 
-<file path=ppt/slides/slide6.xml><?xml version="1.0" encoding="utf-8"?>
+<file path=ppt/slides/slide9.xml><?xml version="1.0" encoding="utf-8"?>
 <p:sld xmlns:a="http://schemas.openxmlformats.org/drawingml/2006/main" xmlns:r="http://schemas.openxmlformats.org/officeDocument/2006/relationships" xmlns:p="http://schemas.openxmlformats.org/presentationml/2006/main">
   <p:cSld>
     <p:spTree>
@@ -13064,57 +13514,64 @@
           <a:chExt cx="0" cy="0"/>
         </a:xfrm>
       </p:grpSpPr>
-      <p:pic>
-        <p:nvPicPr>
-          <p:cNvPr id="5122" name="Picture 2" descr="https://i.ytimg.com/vi/LEq9P81N3U4/maxresdefault.jpg">
+      <p:sp>
+        <p:nvSpPr>
+          <p:cNvPr id="5" name="Título 4">
             <a:extLst>
               <a:ext uri="{FF2B5EF4-FFF2-40B4-BE49-F238E27FC236}">
-                <a16:creationId xmlns:a16="http://schemas.microsoft.com/office/drawing/2014/main" id="{999FDEBB-FB27-422E-B2A1-7ECC76D9E4A8}"/>
+                <a16:creationId xmlns:a16="http://schemas.microsoft.com/office/drawing/2014/main" id="{E22E23E5-04DC-4FC4-9D0D-4F53B2246B2A}"/>
               </a:ext>
             </a:extLst>
           </p:cNvPr>
-          <p:cNvPicPr>
-            <a:picLocks noChangeAspect="1" noChangeArrowheads="1"/>
-          </p:cNvPicPr>
-          <p:nvPr/>
-        </p:nvPicPr>
-        <p:blipFill>
-          <a:blip r:embed="rId2">
+          <p:cNvSpPr>
+            <a:spLocks noGrp="1"/>
+          </p:cNvSpPr>
+          <p:nvPr>
+            <p:ph type="title"/>
+          </p:nvPr>
+        </p:nvSpPr>
+        <p:spPr/>
+        <p:txBody>
+          <a:bodyPr/>
+          <a:lstStyle/>
+          <a:p>
+            <a:r>
+              <a:rPr lang="es-419" dirty="0"/>
+              <a:t>resultados</a:t>
+            </a:r>
+            <a:endParaRPr lang="es-CO" dirty="0"/>
+          </a:p>
+        </p:txBody>
+      </p:sp>
+      <p:sp>
+        <p:nvSpPr>
+          <p:cNvPr id="7" name="Marcador de texto 6">
             <a:extLst>
-              <a:ext uri="{28A0092B-C50C-407E-A947-70E740481C1C}">
-                <a14:useLocalDpi xmlns:a14="http://schemas.microsoft.com/office/drawing/2010/main" val="0"/>
+              <a:ext uri="{FF2B5EF4-FFF2-40B4-BE49-F238E27FC236}">
+                <a16:creationId xmlns:a16="http://schemas.microsoft.com/office/drawing/2014/main" id="{3403E6E4-2389-491F-B13D-6FB4151912F9}"/>
               </a:ext>
             </a:extLst>
-          </a:blip>
-          <a:srcRect/>
-          <a:stretch>
-            <a:fillRect/>
-          </a:stretch>
-        </p:blipFill>
-        <p:spPr bwMode="auto">
-          <a:xfrm>
-            <a:off x="1113185" y="616227"/>
-            <a:ext cx="10000971" cy="5625546"/>
-          </a:xfrm>
-          <a:prstGeom prst="rect">
-            <a:avLst/>
-          </a:prstGeom>
-          <a:noFill/>
-          <a:extLst>
-            <a:ext uri="{909E8E84-426E-40DD-AFC4-6F175D3DCCD1}">
-              <a14:hiddenFill xmlns:a14="http://schemas.microsoft.com/office/drawing/2010/main">
-                <a:solidFill>
-                  <a:srgbClr val="FFFFFF"/>
-                </a:solidFill>
-              </a14:hiddenFill>
-            </a:ext>
-          </a:extLst>
-        </p:spPr>
-      </p:pic>
+          </p:cNvPr>
+          <p:cNvSpPr>
+            <a:spLocks noGrp="1"/>
+          </p:cNvSpPr>
+          <p:nvPr>
+            <p:ph type="body" idx="1"/>
+          </p:nvPr>
+        </p:nvSpPr>
+        <p:spPr/>
+        <p:txBody>
+          <a:bodyPr/>
+          <a:lstStyle/>
+          <a:p>
+            <a:endParaRPr lang="es-CO"/>
+          </a:p>
+        </p:txBody>
+      </p:sp>
     </p:spTree>
     <p:extLst>
       <p:ext uri="{BB962C8B-B14F-4D97-AF65-F5344CB8AC3E}">
-        <p14:creationId xmlns:p14="http://schemas.microsoft.com/office/powerpoint/2010/main" val="3075115726"/>
+        <p14:creationId xmlns:p14="http://schemas.microsoft.com/office/powerpoint/2010/main" val="1862221296"/>
       </p:ext>
     </p:extLst>
   </p:cSld>

</xml_diff>